<commit_message>
Update link on slides
</commit_message>
<xml_diff>
--- a/Intro EZ.pptx
+++ b/Intro EZ.pptx
@@ -214,7 +214,7 @@
           <a:p>
             <a:fld id="{7EB0F12F-9F6B-AC40-ABB9-7C412DBCC275}" type="datetimeFigureOut">
               <a:rPr lang="en-US" smtClean="0"/>
-              <a:t>11/20/17</a:t>
+              <a:t>11/22/17</a:t>
             </a:fld>
             <a:endParaRPr lang="en-US"/>
           </a:p>
@@ -1117,7 +1117,7 @@
           <a:p>
             <a:fld id="{DAA3EBFB-44B7-9D41-96C7-AC03C7128191}" type="datetimeFigureOut">
               <a:rPr lang="en-US" smtClean="0"/>
-              <a:t>11/20/17</a:t>
+              <a:t>11/22/17</a:t>
             </a:fld>
             <a:endParaRPr lang="en-US"/>
           </a:p>
@@ -1287,7 +1287,7 @@
           <a:p>
             <a:fld id="{DAA3EBFB-44B7-9D41-96C7-AC03C7128191}" type="datetimeFigureOut">
               <a:rPr lang="en-US" smtClean="0"/>
-              <a:t>11/20/17</a:t>
+              <a:t>11/22/17</a:t>
             </a:fld>
             <a:endParaRPr lang="en-US"/>
           </a:p>
@@ -1467,7 +1467,7 @@
           <a:p>
             <a:fld id="{DAA3EBFB-44B7-9D41-96C7-AC03C7128191}" type="datetimeFigureOut">
               <a:rPr lang="en-US" smtClean="0"/>
-              <a:t>11/20/17</a:t>
+              <a:t>11/22/17</a:t>
             </a:fld>
             <a:endParaRPr lang="en-US"/>
           </a:p>
@@ -1637,7 +1637,7 @@
           <a:p>
             <a:fld id="{DAA3EBFB-44B7-9D41-96C7-AC03C7128191}" type="datetimeFigureOut">
               <a:rPr lang="en-US" smtClean="0"/>
-              <a:t>11/20/17</a:t>
+              <a:t>11/22/17</a:t>
             </a:fld>
             <a:endParaRPr lang="en-US"/>
           </a:p>
@@ -1883,7 +1883,7 @@
           <a:p>
             <a:fld id="{DAA3EBFB-44B7-9D41-96C7-AC03C7128191}" type="datetimeFigureOut">
               <a:rPr lang="en-US" smtClean="0"/>
-              <a:t>11/20/17</a:t>
+              <a:t>11/22/17</a:t>
             </a:fld>
             <a:endParaRPr lang="en-US"/>
           </a:p>
@@ -2115,7 +2115,7 @@
           <a:p>
             <a:fld id="{DAA3EBFB-44B7-9D41-96C7-AC03C7128191}" type="datetimeFigureOut">
               <a:rPr lang="en-US" smtClean="0"/>
-              <a:t>11/20/17</a:t>
+              <a:t>11/22/17</a:t>
             </a:fld>
             <a:endParaRPr lang="en-US"/>
           </a:p>
@@ -2482,7 +2482,7 @@
           <a:p>
             <a:fld id="{DAA3EBFB-44B7-9D41-96C7-AC03C7128191}" type="datetimeFigureOut">
               <a:rPr lang="en-US" smtClean="0"/>
-              <a:t>11/20/17</a:t>
+              <a:t>11/22/17</a:t>
             </a:fld>
             <a:endParaRPr lang="en-US"/>
           </a:p>
@@ -2600,7 +2600,7 @@
           <a:p>
             <a:fld id="{DAA3EBFB-44B7-9D41-96C7-AC03C7128191}" type="datetimeFigureOut">
               <a:rPr lang="en-US" smtClean="0"/>
-              <a:t>11/20/17</a:t>
+              <a:t>11/22/17</a:t>
             </a:fld>
             <a:endParaRPr lang="en-US"/>
           </a:p>
@@ -2695,7 +2695,7 @@
           <a:p>
             <a:fld id="{DAA3EBFB-44B7-9D41-96C7-AC03C7128191}" type="datetimeFigureOut">
               <a:rPr lang="en-US" smtClean="0"/>
-              <a:t>11/20/17</a:t>
+              <a:t>11/22/17</a:t>
             </a:fld>
             <a:endParaRPr lang="en-US"/>
           </a:p>
@@ -2972,7 +2972,7 @@
           <a:p>
             <a:fld id="{DAA3EBFB-44B7-9D41-96C7-AC03C7128191}" type="datetimeFigureOut">
               <a:rPr lang="en-US" smtClean="0"/>
-              <a:t>11/20/17</a:t>
+              <a:t>11/22/17</a:t>
             </a:fld>
             <a:endParaRPr lang="en-US"/>
           </a:p>
@@ -3225,7 +3225,7 @@
           <a:p>
             <a:fld id="{DAA3EBFB-44B7-9D41-96C7-AC03C7128191}" type="datetimeFigureOut">
               <a:rPr lang="en-US" smtClean="0"/>
-              <a:t>11/20/17</a:t>
+              <a:t>11/22/17</a:t>
             </a:fld>
             <a:endParaRPr lang="en-US"/>
           </a:p>
@@ -3438,7 +3438,7 @@
           <a:p>
             <a:fld id="{DAA3EBFB-44B7-9D41-96C7-AC03C7128191}" type="datetimeFigureOut">
               <a:rPr lang="en-US" smtClean="0"/>
-              <a:t>11/20/17</a:t>
+              <a:t>11/22/17</a:t>
             </a:fld>
             <a:endParaRPr lang="en-US"/>
           </a:p>
@@ -6820,7 +6820,7 @@
         <p:spPr/>
         <p:txBody>
           <a:bodyPr>
-            <a:normAutofit fontScale="92500" lnSpcReduction="10000"/>
+            <a:normAutofit fontScale="92500" lnSpcReduction="20000"/>
           </a:bodyPr>
           <a:lstStyle/>
           <a:p>
@@ -6887,8 +6887,29 @@
               <a:t>EZ practical on </a:t>
             </a:r>
             <a:r>
+              <a:rPr lang="en-US" dirty="0" err="1" smtClean="0"/>
+              <a:t>Github</a:t>
+            </a:r>
+            <a:r>
               <a:rPr lang="en-US" dirty="0" smtClean="0"/>
-              <a:t>Dropbox</a:t>
+              <a:t>:</a:t>
+            </a:r>
+          </a:p>
+          <a:p>
+            <a:pPr marL="0" indent="0">
+              <a:buNone/>
+            </a:pPr>
+            <a:r>
+              <a:rPr lang="en-US" dirty="0" err="1" smtClean="0"/>
+              <a:t>www.github.com</a:t>
+            </a:r>
+            <a:r>
+              <a:rPr lang="en-US" dirty="0" smtClean="0"/>
+              <a:t>/stevenm1/</a:t>
+            </a:r>
+            <a:r>
+              <a:rPr lang="en-US" dirty="0" err="1" smtClean="0"/>
+              <a:t>ez</a:t>
             </a:r>
             <a:endParaRPr lang="en-US" dirty="0"/>
           </a:p>
@@ -6936,7 +6957,7 @@
         <p:spPr/>
         <p:txBody>
           <a:bodyPr>
-            <a:normAutofit fontScale="92500" lnSpcReduction="10000"/>
+            <a:normAutofit fontScale="92500" lnSpcReduction="20000"/>
           </a:bodyPr>
           <a:lstStyle/>
           <a:p>
@@ -7090,11 +7111,7 @@
             </a:r>
             <a:r>
               <a:rPr lang="en-US" i="1" dirty="0" smtClean="0"/>
-              <a:t>often </a:t>
-            </a:r>
-            <a:r>
-              <a:rPr lang="en-US" i="1" dirty="0" smtClean="0"/>
-              <a:t>violated!</a:t>
+              <a:t>often violated!</a:t>
             </a:r>
           </a:p>
           <a:p>

</xml_diff>